<commit_message>
day 7 ppt updated
</commit_message>
<xml_diff>
--- a/Course Day 7/Webmonk Course (day - 7).pptx
+++ b/Course Day 7/Webmonk Course (day - 7).pptx
@@ -265,7 +265,7 @@
   </p:defaultTextStyle>
   <p:extLst>
     <p:ext uri="http://customooxmlschemas.google.com/">
-      <go:slidesCustomData xmlns:go="http://customooxmlschemas.google.com/" r:id="rId23" roundtripDataSignature="AMtx7mh0P9fcR5Ey0xjbeqVUdQC/ysCkhQ=="/>
+      <go:slidesCustomData xmlns:go="http://customooxmlschemas.google.com/" r:id="rId23" roundtripDataSignature="AMtx7migKSPXCIysTyj8XygzQTKeayG+gA=="/>
     </p:ext>
   </p:extLst>
 </p:presentation>
@@ -21121,66 +21121,9 @@
           </a:p>
         </p:txBody>
       </p:sp>
-      <p:sp>
-        <p:nvSpPr>
-          <p:cNvPr id="171" name="Google Shape;171;ga561df5dd9_1_12"/>
-          <p:cNvSpPr txBox="1"/>
-          <p:nvPr/>
-        </p:nvSpPr>
-        <p:spPr>
-          <a:xfrm>
-            <a:off x="2231136" y="2868706"/>
-            <a:ext cx="7729800" cy="3324300"/>
-          </a:xfrm>
-          <a:prstGeom prst="rect">
-            <a:avLst/>
-          </a:prstGeom>
-          <a:noFill/>
-          <a:ln>
-            <a:noFill/>
-          </a:ln>
-        </p:spPr>
-        <p:txBody>
-          <a:bodyPr anchorCtr="0" anchor="t" bIns="91425" lIns="91425" spcFirstLastPara="1" rIns="91425" wrap="square" tIns="91425">
-            <a:noAutofit/>
-          </a:bodyPr>
-          <a:lstStyle/>
-          <a:p>
-            <a:pPr indent="0" lvl="0" marL="457200" marR="0" rtl="0" algn="l">
-              <a:lnSpc>
-                <a:spcPct val="100000"/>
-              </a:lnSpc>
-              <a:spcBef>
-                <a:spcPts val="1000"/>
-              </a:spcBef>
-              <a:spcAft>
-                <a:spcPts val="0"/>
-              </a:spcAft>
-              <a:buClr>
-                <a:srgbClr val="000000"/>
-              </a:buClr>
-              <a:buSzPts val="1800"/>
-              <a:buFont typeface="Arial"/>
-              <a:buNone/>
-            </a:pPr>
-            <a:r>
-              <a:t/>
-            </a:r>
-            <a:endParaRPr b="0" i="0" sz="1800" u="none" cap="none" strike="noStrike">
-              <a:solidFill>
-                <a:srgbClr val="000000"/>
-              </a:solidFill>
-              <a:latin typeface="Arial"/>
-              <a:ea typeface="Arial"/>
-              <a:cs typeface="Arial"/>
-              <a:sym typeface="Arial"/>
-            </a:endParaRPr>
-          </a:p>
-        </p:txBody>
-      </p:sp>
       <p:pic>
         <p:nvPicPr>
-          <p:cNvPr id="172" name="Google Shape;172;ga561df5dd9_1_12"/>
+          <p:cNvPr id="171" name="Google Shape;171;ga561df5dd9_1_12"/>
           <p:cNvPicPr preferRelativeResize="0"/>
           <p:nvPr/>
         </p:nvPicPr>
@@ -21193,8 +21136,8 @@
         </p:blipFill>
         <p:spPr>
           <a:xfrm>
-            <a:off x="3285813" y="2504525"/>
-            <a:ext cx="5620375" cy="3572875"/>
+            <a:off x="3062638" y="2336350"/>
+            <a:ext cx="6066775" cy="3856650"/>
           </a:xfrm>
           <a:prstGeom prst="rect">
             <a:avLst/>
@@ -21205,6 +21148,52 @@
           </a:ln>
         </p:spPr>
       </p:pic>
+      <p:sp>
+        <p:nvSpPr>
+          <p:cNvPr id="172" name="Google Shape;172;ga561df5dd9_1_12"/>
+          <p:cNvSpPr txBox="1"/>
+          <p:nvPr/>
+        </p:nvSpPr>
+        <p:spPr>
+          <a:xfrm>
+            <a:off x="6046725" y="6169375"/>
+            <a:ext cx="811200" cy="400200"/>
+          </a:xfrm>
+          <a:prstGeom prst="rect">
+            <a:avLst/>
+          </a:prstGeom>
+          <a:noFill/>
+          <a:ln>
+            <a:noFill/>
+          </a:ln>
+        </p:spPr>
+        <p:txBody>
+          <a:bodyPr anchorCtr="0" anchor="t" bIns="91425" lIns="91425" spcFirstLastPara="1" rIns="91425" wrap="square" tIns="91425">
+            <a:spAutoFit/>
+          </a:bodyPr>
+          <a:lstStyle/>
+          <a:p>
+            <a:pPr indent="0" lvl="0" marL="0" rtl="0" algn="l">
+              <a:spcBef>
+                <a:spcPts val="0"/>
+              </a:spcBef>
+              <a:spcAft>
+                <a:spcPts val="0"/>
+              </a:spcAft>
+              <a:buNone/>
+            </a:pPr>
+            <a:r>
+              <a:t/>
+            </a:r>
+            <a:endParaRPr>
+              <a:latin typeface="Gill Sans"/>
+              <a:ea typeface="Gill Sans"/>
+              <a:cs typeface="Gill Sans"/>
+              <a:sym typeface="Gill Sans"/>
+            </a:endParaRPr>
+          </a:p>
+        </p:txBody>
+      </p:sp>
     </p:spTree>
   </p:cSld>
   <p:clrMapOvr>

</xml_diff>